<commit_message>
Added users lecture and homework
</commit_message>
<xml_diff>
--- a/LinuxAdm/LinuxAdm3.pptx
+++ b/LinuxAdm/LinuxAdm3.pptx
@@ -7,6 +7,22 @@
   <p:sldIdLst>
     <p:sldId id="256" r:id="rId2"/>
     <p:sldId id="384" r:id="rId3"/>
+    <p:sldId id="385" r:id="rId4"/>
+    <p:sldId id="386" r:id="rId5"/>
+    <p:sldId id="387" r:id="rId6"/>
+    <p:sldId id="388" r:id="rId7"/>
+    <p:sldId id="389" r:id="rId8"/>
+    <p:sldId id="390" r:id="rId9"/>
+    <p:sldId id="391" r:id="rId10"/>
+    <p:sldId id="392" r:id="rId11"/>
+    <p:sldId id="393" r:id="rId12"/>
+    <p:sldId id="395" r:id="rId13"/>
+    <p:sldId id="396" r:id="rId14"/>
+    <p:sldId id="397" r:id="rId15"/>
+    <p:sldId id="398" r:id="rId16"/>
+    <p:sldId id="399" r:id="rId17"/>
+    <p:sldId id="400" r:id="rId18"/>
+    <p:sldId id="401" r:id="rId19"/>
   </p:sldIdLst>
   <p:sldSz cx="12192000" cy="6858000"/>
   <p:notesSz cx="6858000" cy="9144000"/>
@@ -262,7 +278,7 @@
           <a:p>
             <a:fld id="{052ECE81-C73C-E543-9046-300010F65159}" type="datetimeFigureOut">
               <a:rPr lang="en-RU" smtClean="0"/>
-              <a:t>20.12.2020</a:t>
+              <a:t>25.12.2020</a:t>
             </a:fld>
             <a:endParaRPr lang="en-RU"/>
           </a:p>
@@ -462,7 +478,7 @@
           <a:p>
             <a:fld id="{052ECE81-C73C-E543-9046-300010F65159}" type="datetimeFigureOut">
               <a:rPr lang="en-RU" smtClean="0"/>
-              <a:t>20.12.2020</a:t>
+              <a:t>25.12.2020</a:t>
             </a:fld>
             <a:endParaRPr lang="en-RU"/>
           </a:p>
@@ -672,7 +688,7 @@
           <a:p>
             <a:fld id="{052ECE81-C73C-E543-9046-300010F65159}" type="datetimeFigureOut">
               <a:rPr lang="en-RU" smtClean="0"/>
-              <a:t>20.12.2020</a:t>
+              <a:t>25.12.2020</a:t>
             </a:fld>
             <a:endParaRPr lang="en-RU"/>
           </a:p>
@@ -1139,7 +1155,7 @@
           <a:p>
             <a:fld id="{052ECE81-C73C-E543-9046-300010F65159}" type="datetimeFigureOut">
               <a:rPr lang="en-RU" smtClean="0"/>
-              <a:t>20.12.2020</a:t>
+              <a:t>25.12.2020</a:t>
             </a:fld>
             <a:endParaRPr lang="en-RU"/>
           </a:p>
@@ -1415,7 +1431,7 @@
           <a:p>
             <a:fld id="{052ECE81-C73C-E543-9046-300010F65159}" type="datetimeFigureOut">
               <a:rPr lang="en-RU" smtClean="0"/>
-              <a:t>20.12.2020</a:t>
+              <a:t>25.12.2020</a:t>
             </a:fld>
             <a:endParaRPr lang="en-RU"/>
           </a:p>
@@ -1683,7 +1699,7 @@
           <a:p>
             <a:fld id="{052ECE81-C73C-E543-9046-300010F65159}" type="datetimeFigureOut">
               <a:rPr lang="en-RU" smtClean="0"/>
-              <a:t>20.12.2020</a:t>
+              <a:t>25.12.2020</a:t>
             </a:fld>
             <a:endParaRPr lang="en-RU"/>
           </a:p>
@@ -2098,7 +2114,7 @@
           <a:p>
             <a:fld id="{052ECE81-C73C-E543-9046-300010F65159}" type="datetimeFigureOut">
               <a:rPr lang="en-RU" smtClean="0"/>
-              <a:t>20.12.2020</a:t>
+              <a:t>25.12.2020</a:t>
             </a:fld>
             <a:endParaRPr lang="en-RU"/>
           </a:p>
@@ -2240,7 +2256,7 @@
           <a:p>
             <a:fld id="{052ECE81-C73C-E543-9046-300010F65159}" type="datetimeFigureOut">
               <a:rPr lang="en-RU" smtClean="0"/>
-              <a:t>20.12.2020</a:t>
+              <a:t>25.12.2020</a:t>
             </a:fld>
             <a:endParaRPr lang="en-RU"/>
           </a:p>
@@ -2353,7 +2369,7 @@
           <a:p>
             <a:fld id="{052ECE81-C73C-E543-9046-300010F65159}" type="datetimeFigureOut">
               <a:rPr lang="en-RU" smtClean="0"/>
-              <a:t>20.12.2020</a:t>
+              <a:t>25.12.2020</a:t>
             </a:fld>
             <a:endParaRPr lang="en-RU"/>
           </a:p>
@@ -2666,7 +2682,7 @@
           <a:p>
             <a:fld id="{052ECE81-C73C-E543-9046-300010F65159}" type="datetimeFigureOut">
               <a:rPr lang="en-RU" smtClean="0"/>
-              <a:t>20.12.2020</a:t>
+              <a:t>25.12.2020</a:t>
             </a:fld>
             <a:endParaRPr lang="en-RU"/>
           </a:p>
@@ -2955,7 +2971,7 @@
           <a:p>
             <a:fld id="{052ECE81-C73C-E543-9046-300010F65159}" type="datetimeFigureOut">
               <a:rPr lang="en-RU" smtClean="0"/>
-              <a:t>20.12.2020</a:t>
+              <a:t>25.12.2020</a:t>
             </a:fld>
             <a:endParaRPr lang="en-RU"/>
           </a:p>
@@ -3198,7 +3214,7 @@
           <a:p>
             <a:fld id="{052ECE81-C73C-E543-9046-300010F65159}" type="datetimeFigureOut">
               <a:rPr lang="en-RU" smtClean="0"/>
-              <a:t>20.12.2020</a:t>
+              <a:t>25.12.2020</a:t>
             </a:fld>
             <a:endParaRPr lang="en-RU"/>
           </a:p>
@@ -3667,7 +3683,7 @@
           <a:p>
             <a:r>
               <a:rPr lang="en-RU" dirty="0"/>
-              <a:t>Users, Network, modules, sysctl</a:t>
+              <a:t>Users, Network, modules, sysctl, etc.</a:t>
             </a:r>
           </a:p>
         </p:txBody>
@@ -3676,6 +3692,1212 @@
     <p:extLst>
       <p:ext uri="{BB962C8B-B14F-4D97-AF65-F5344CB8AC3E}">
         <p14:creationId xmlns:p14="http://schemas.microsoft.com/office/powerpoint/2010/main" val="471701103"/>
+      </p:ext>
+    </p:extLst>
+  </p:cSld>
+  <p:clrMapOvr>
+    <a:masterClrMapping/>
+  </p:clrMapOvr>
+</p:sld>
+</file>
+
+<file path=ppt/slides/slide10.xml><?xml version="1.0" encoding="utf-8"?>
+<p:sld xmlns:a="http://schemas.openxmlformats.org/drawingml/2006/main" xmlns:r="http://schemas.openxmlformats.org/officeDocument/2006/relationships" xmlns:p="http://schemas.openxmlformats.org/presentationml/2006/main">
+  <p:cSld>
+    <p:spTree>
+      <p:nvGrpSpPr>
+        <p:cNvPr id="1" name=""/>
+        <p:cNvGrpSpPr/>
+        <p:nvPr/>
+      </p:nvGrpSpPr>
+      <p:grpSpPr>
+        <a:xfrm>
+          <a:off x="0" y="0"/>
+          <a:ext cx="0" cy="0"/>
+          <a:chOff x="0" y="0"/>
+          <a:chExt cx="0" cy="0"/>
+        </a:xfrm>
+      </p:grpSpPr>
+      <p:sp>
+        <p:nvSpPr>
+          <p:cNvPr id="3" name="Text Placeholder 2">
+            <a:extLst>
+              <a:ext uri="{FF2B5EF4-FFF2-40B4-BE49-F238E27FC236}">
+                <a16:creationId xmlns:a16="http://schemas.microsoft.com/office/drawing/2014/main" id="{99F5DBC8-929E-455F-BA07-52462E7B4FC5}"/>
+              </a:ext>
+            </a:extLst>
+          </p:cNvPr>
+          <p:cNvSpPr>
+            <a:spLocks noGrp="1"/>
+          </p:cNvSpPr>
+          <p:nvPr>
+            <p:ph type="body" sz="quarter" idx="10"/>
+          </p:nvPr>
+        </p:nvSpPr>
+        <p:spPr/>
+        <p:txBody>
+          <a:bodyPr/>
+          <a:lstStyle/>
+          <a:p>
+            <a:r>
+              <a:rPr lang="en-US" dirty="0"/>
+              <a:t>Users management</a:t>
+            </a:r>
+          </a:p>
+        </p:txBody>
+      </p:sp>
+      <p:sp>
+        <p:nvSpPr>
+          <p:cNvPr id="2" name="TextBox 1">
+            <a:extLst>
+              <a:ext uri="{FF2B5EF4-FFF2-40B4-BE49-F238E27FC236}">
+                <a16:creationId xmlns:a16="http://schemas.microsoft.com/office/drawing/2014/main" id="{F6335E74-9AFE-4543-9F1F-F3042CF2F16D}"/>
+              </a:ext>
+            </a:extLst>
+          </p:cNvPr>
+          <p:cNvSpPr txBox="1"/>
+          <p:nvPr/>
+        </p:nvSpPr>
+        <p:spPr>
+          <a:xfrm>
+            <a:off x="3048000" y="2449689"/>
+            <a:ext cx="1099981" cy="2031325"/>
+          </a:xfrm>
+          <a:prstGeom prst="rect">
+            <a:avLst/>
+          </a:prstGeom>
+          <a:noFill/>
+        </p:spPr>
+        <p:txBody>
+          <a:bodyPr wrap="none" rtlCol="0">
+            <a:spAutoFit/>
+          </a:bodyPr>
+          <a:lstStyle/>
+          <a:p>
+            <a:r>
+              <a:rPr lang="en-US" dirty="0"/>
+              <a:t>passwd</a:t>
+            </a:r>
+          </a:p>
+          <a:p>
+            <a:r>
+              <a:rPr lang="en-US" dirty="0" err="1"/>
+              <a:t>chpasswd</a:t>
+            </a:r>
+            <a:endParaRPr lang="en-US" dirty="0"/>
+          </a:p>
+          <a:p>
+            <a:r>
+              <a:rPr lang="en-US" dirty="0" err="1"/>
+              <a:t>chage</a:t>
+            </a:r>
+            <a:endParaRPr lang="en-US" dirty="0"/>
+          </a:p>
+          <a:p>
+            <a:r>
+              <a:rPr lang="en-US" dirty="0" err="1"/>
+              <a:t>gpasswd</a:t>
+            </a:r>
+            <a:endParaRPr lang="en-US" dirty="0"/>
+          </a:p>
+          <a:p>
+            <a:r>
+              <a:rPr lang="en-US" dirty="0" err="1"/>
+              <a:t>chfn</a:t>
+            </a:r>
+            <a:endParaRPr lang="en-US" dirty="0"/>
+          </a:p>
+          <a:p>
+            <a:r>
+              <a:rPr lang="en-US" dirty="0"/>
+              <a:t>finger</a:t>
+            </a:r>
+          </a:p>
+          <a:p>
+            <a:endParaRPr lang="en-US" dirty="0"/>
+          </a:p>
+        </p:txBody>
+      </p:sp>
+    </p:spTree>
+    <p:extLst>
+      <p:ext uri="{BB962C8B-B14F-4D97-AF65-F5344CB8AC3E}">
+        <p14:creationId xmlns:p14="http://schemas.microsoft.com/office/powerpoint/2010/main" val="384676322"/>
+      </p:ext>
+    </p:extLst>
+  </p:cSld>
+  <p:clrMapOvr>
+    <a:masterClrMapping/>
+  </p:clrMapOvr>
+</p:sld>
+</file>
+
+<file path=ppt/slides/slide11.xml><?xml version="1.0" encoding="utf-8"?>
+<p:sld xmlns:a="http://schemas.openxmlformats.org/drawingml/2006/main" xmlns:r="http://schemas.openxmlformats.org/officeDocument/2006/relationships" xmlns:p="http://schemas.openxmlformats.org/presentationml/2006/main">
+  <p:cSld>
+    <p:spTree>
+      <p:nvGrpSpPr>
+        <p:cNvPr id="1" name=""/>
+        <p:cNvGrpSpPr/>
+        <p:nvPr/>
+      </p:nvGrpSpPr>
+      <p:grpSpPr>
+        <a:xfrm>
+          <a:off x="0" y="0"/>
+          <a:ext cx="0" cy="0"/>
+          <a:chOff x="0" y="0"/>
+          <a:chExt cx="0" cy="0"/>
+        </a:xfrm>
+      </p:grpSpPr>
+      <p:sp>
+        <p:nvSpPr>
+          <p:cNvPr id="3" name="Text Placeholder 2">
+            <a:extLst>
+              <a:ext uri="{FF2B5EF4-FFF2-40B4-BE49-F238E27FC236}">
+                <a16:creationId xmlns:a16="http://schemas.microsoft.com/office/drawing/2014/main" id="{99F5DBC8-929E-455F-BA07-52462E7B4FC5}"/>
+              </a:ext>
+            </a:extLst>
+          </p:cNvPr>
+          <p:cNvSpPr>
+            <a:spLocks noGrp="1"/>
+          </p:cNvSpPr>
+          <p:nvPr>
+            <p:ph type="body" sz="quarter" idx="10"/>
+          </p:nvPr>
+        </p:nvSpPr>
+        <p:spPr/>
+        <p:txBody>
+          <a:bodyPr/>
+          <a:lstStyle/>
+          <a:p>
+            <a:r>
+              <a:rPr lang="en-US" dirty="0"/>
+              <a:t>Users management</a:t>
+            </a:r>
+          </a:p>
+        </p:txBody>
+      </p:sp>
+      <p:sp>
+        <p:nvSpPr>
+          <p:cNvPr id="2" name="TextBox 1">
+            <a:extLst>
+              <a:ext uri="{FF2B5EF4-FFF2-40B4-BE49-F238E27FC236}">
+                <a16:creationId xmlns:a16="http://schemas.microsoft.com/office/drawing/2014/main" id="{F6335E74-9AFE-4543-9F1F-F3042CF2F16D}"/>
+              </a:ext>
+            </a:extLst>
+          </p:cNvPr>
+          <p:cNvSpPr txBox="1"/>
+          <p:nvPr/>
+        </p:nvSpPr>
+        <p:spPr>
+          <a:xfrm>
+            <a:off x="3048000" y="2449689"/>
+            <a:ext cx="697627" cy="1754326"/>
+          </a:xfrm>
+          <a:prstGeom prst="rect">
+            <a:avLst/>
+          </a:prstGeom>
+          <a:noFill/>
+        </p:spPr>
+        <p:txBody>
+          <a:bodyPr wrap="none" rtlCol="0">
+            <a:spAutoFit/>
+          </a:bodyPr>
+          <a:lstStyle/>
+          <a:p>
+            <a:r>
+              <a:rPr lang="en-US" dirty="0" err="1"/>
+              <a:t>vipw</a:t>
+            </a:r>
+            <a:endParaRPr lang="en-US" dirty="0"/>
+          </a:p>
+          <a:p>
+            <a:r>
+              <a:rPr lang="en-US" dirty="0" err="1"/>
+              <a:t>vigr</a:t>
+            </a:r>
+            <a:endParaRPr lang="en-US" dirty="0"/>
+          </a:p>
+          <a:p>
+            <a:endParaRPr lang="en-US" dirty="0"/>
+          </a:p>
+          <a:p>
+            <a:endParaRPr lang="en-US" dirty="0"/>
+          </a:p>
+          <a:p>
+            <a:r>
+              <a:rPr lang="en-US" dirty="0" err="1"/>
+              <a:t>pwck</a:t>
+            </a:r>
+            <a:endParaRPr lang="en-US" dirty="0"/>
+          </a:p>
+          <a:p>
+            <a:r>
+              <a:rPr lang="en-US" dirty="0" err="1"/>
+              <a:t>grpck</a:t>
+            </a:r>
+            <a:endParaRPr lang="en-US" dirty="0"/>
+          </a:p>
+        </p:txBody>
+      </p:sp>
+    </p:spTree>
+    <p:extLst>
+      <p:ext uri="{BB962C8B-B14F-4D97-AF65-F5344CB8AC3E}">
+        <p14:creationId xmlns:p14="http://schemas.microsoft.com/office/powerpoint/2010/main" val="1810737859"/>
+      </p:ext>
+    </p:extLst>
+  </p:cSld>
+  <p:clrMapOvr>
+    <a:masterClrMapping/>
+  </p:clrMapOvr>
+</p:sld>
+</file>
+
+<file path=ppt/slides/slide12.xml><?xml version="1.0" encoding="utf-8"?>
+<p:sld xmlns:a="http://schemas.openxmlformats.org/drawingml/2006/main" xmlns:r="http://schemas.openxmlformats.org/officeDocument/2006/relationships" xmlns:p="http://schemas.openxmlformats.org/presentationml/2006/main">
+  <p:cSld>
+    <p:spTree>
+      <p:nvGrpSpPr>
+        <p:cNvPr id="1" name=""/>
+        <p:cNvGrpSpPr/>
+        <p:nvPr/>
+      </p:nvGrpSpPr>
+      <p:grpSpPr>
+        <a:xfrm>
+          <a:off x="0" y="0"/>
+          <a:ext cx="0" cy="0"/>
+          <a:chOff x="0" y="0"/>
+          <a:chExt cx="0" cy="0"/>
+        </a:xfrm>
+      </p:grpSpPr>
+      <p:sp>
+        <p:nvSpPr>
+          <p:cNvPr id="3" name="Text Placeholder 2">
+            <a:extLst>
+              <a:ext uri="{FF2B5EF4-FFF2-40B4-BE49-F238E27FC236}">
+                <a16:creationId xmlns:a16="http://schemas.microsoft.com/office/drawing/2014/main" id="{99F5DBC8-929E-455F-BA07-52462E7B4FC5}"/>
+              </a:ext>
+            </a:extLst>
+          </p:cNvPr>
+          <p:cNvSpPr>
+            <a:spLocks noGrp="1"/>
+          </p:cNvSpPr>
+          <p:nvPr>
+            <p:ph type="body" sz="quarter" idx="10"/>
+          </p:nvPr>
+        </p:nvSpPr>
+        <p:spPr/>
+        <p:txBody>
+          <a:bodyPr/>
+          <a:lstStyle/>
+          <a:p>
+            <a:r>
+              <a:rPr lang="en-US" dirty="0"/>
+              <a:t>PAM Pluggable Authentication Module</a:t>
+            </a:r>
+          </a:p>
+        </p:txBody>
+      </p:sp>
+      <p:pic>
+        <p:nvPicPr>
+          <p:cNvPr id="5" name="Picture 4">
+            <a:extLst>
+              <a:ext uri="{FF2B5EF4-FFF2-40B4-BE49-F238E27FC236}">
+                <a16:creationId xmlns:a16="http://schemas.microsoft.com/office/drawing/2014/main" id="{746CA496-8E67-E440-B44C-E874AC14B988}"/>
+              </a:ext>
+            </a:extLst>
+          </p:cNvPr>
+          <p:cNvPicPr>
+            <a:picLocks noChangeAspect="1"/>
+          </p:cNvPicPr>
+          <p:nvPr/>
+        </p:nvPicPr>
+        <p:blipFill>
+          <a:blip r:embed="rId2"/>
+          <a:stretch>
+            <a:fillRect/>
+          </a:stretch>
+        </p:blipFill>
+        <p:spPr>
+          <a:xfrm>
+            <a:off x="3093155" y="1179219"/>
+            <a:ext cx="6005689" cy="4499561"/>
+          </a:xfrm>
+          <a:prstGeom prst="rect">
+            <a:avLst/>
+          </a:prstGeom>
+        </p:spPr>
+      </p:pic>
+      <p:sp>
+        <p:nvSpPr>
+          <p:cNvPr id="2" name="TextBox 1">
+            <a:extLst>
+              <a:ext uri="{FF2B5EF4-FFF2-40B4-BE49-F238E27FC236}">
+                <a16:creationId xmlns:a16="http://schemas.microsoft.com/office/drawing/2014/main" id="{CA301AFF-CC91-5549-A066-8F54451EF4D1}"/>
+              </a:ext>
+            </a:extLst>
+          </p:cNvPr>
+          <p:cNvSpPr txBox="1"/>
+          <p:nvPr/>
+        </p:nvSpPr>
+        <p:spPr>
+          <a:xfrm>
+            <a:off x="1059366" y="6188927"/>
+            <a:ext cx="5246244" cy="369332"/>
+          </a:xfrm>
+          <a:prstGeom prst="rect">
+            <a:avLst/>
+          </a:prstGeom>
+          <a:noFill/>
+        </p:spPr>
+        <p:txBody>
+          <a:bodyPr wrap="none" rtlCol="0">
+            <a:spAutoFit/>
+          </a:bodyPr>
+          <a:lstStyle/>
+          <a:p>
+            <a:r>
+              <a:rPr lang="en-RU" dirty="0"/>
+              <a:t>Authentic – </a:t>
+            </a:r>
+            <a:r>
+              <a:rPr lang="ru-RU" dirty="0"/>
+              <a:t>подлинный, достоверный, аутентичный</a:t>
+            </a:r>
+            <a:endParaRPr lang="en-RU" dirty="0"/>
+          </a:p>
+        </p:txBody>
+      </p:sp>
+      <p:sp>
+        <p:nvSpPr>
+          <p:cNvPr id="4" name="TextBox 3">
+            <a:extLst>
+              <a:ext uri="{FF2B5EF4-FFF2-40B4-BE49-F238E27FC236}">
+                <a16:creationId xmlns:a16="http://schemas.microsoft.com/office/drawing/2014/main" id="{854D95CA-21D0-8E4E-8F63-8CDC665EA23B}"/>
+              </a:ext>
+            </a:extLst>
+          </p:cNvPr>
+          <p:cNvSpPr txBox="1"/>
+          <p:nvPr/>
+        </p:nvSpPr>
+        <p:spPr>
+          <a:xfrm>
+            <a:off x="323385" y="1862254"/>
+            <a:ext cx="1335109" cy="1477328"/>
+          </a:xfrm>
+          <a:prstGeom prst="rect">
+            <a:avLst/>
+          </a:prstGeom>
+          <a:noFill/>
+        </p:spPr>
+        <p:txBody>
+          <a:bodyPr wrap="none" rtlCol="0">
+            <a:spAutoFit/>
+          </a:bodyPr>
+          <a:lstStyle/>
+          <a:p>
+            <a:r>
+              <a:rPr lang="en-US" dirty="0"/>
+              <a:t>A A A</a:t>
+            </a:r>
+            <a:br>
+              <a:rPr lang="en-US" dirty="0"/>
+            </a:br>
+            <a:endParaRPr lang="en-US" dirty="0"/>
+          </a:p>
+          <a:p>
+            <a:r>
+              <a:rPr lang="en-US" dirty="0"/>
+              <a:t>Authenticity</a:t>
+            </a:r>
+          </a:p>
+          <a:p>
+            <a:r>
+              <a:rPr lang="en-US" dirty="0"/>
+              <a:t>Authority</a:t>
+            </a:r>
+          </a:p>
+          <a:p>
+            <a:r>
+              <a:rPr lang="en-US" dirty="0"/>
+              <a:t>Accounting</a:t>
+            </a:r>
+            <a:endParaRPr lang="en-RU" dirty="0"/>
+          </a:p>
+        </p:txBody>
+      </p:sp>
+    </p:spTree>
+    <p:extLst>
+      <p:ext uri="{BB962C8B-B14F-4D97-AF65-F5344CB8AC3E}">
+        <p14:creationId xmlns:p14="http://schemas.microsoft.com/office/powerpoint/2010/main" val="3074448714"/>
+      </p:ext>
+    </p:extLst>
+  </p:cSld>
+  <p:clrMapOvr>
+    <a:masterClrMapping/>
+  </p:clrMapOvr>
+</p:sld>
+</file>
+
+<file path=ppt/slides/slide13.xml><?xml version="1.0" encoding="utf-8"?>
+<p:sld xmlns:a="http://schemas.openxmlformats.org/drawingml/2006/main" xmlns:r="http://schemas.openxmlformats.org/officeDocument/2006/relationships" xmlns:p="http://schemas.openxmlformats.org/presentationml/2006/main">
+  <p:cSld>
+    <p:spTree>
+      <p:nvGrpSpPr>
+        <p:cNvPr id="1" name=""/>
+        <p:cNvGrpSpPr/>
+        <p:nvPr/>
+      </p:nvGrpSpPr>
+      <p:grpSpPr>
+        <a:xfrm>
+          <a:off x="0" y="0"/>
+          <a:ext cx="0" cy="0"/>
+          <a:chOff x="0" y="0"/>
+          <a:chExt cx="0" cy="0"/>
+        </a:xfrm>
+      </p:grpSpPr>
+      <p:sp>
+        <p:nvSpPr>
+          <p:cNvPr id="3" name="Text Placeholder 2">
+            <a:extLst>
+              <a:ext uri="{FF2B5EF4-FFF2-40B4-BE49-F238E27FC236}">
+                <a16:creationId xmlns:a16="http://schemas.microsoft.com/office/drawing/2014/main" id="{99F5DBC8-929E-455F-BA07-52462E7B4FC5}"/>
+              </a:ext>
+            </a:extLst>
+          </p:cNvPr>
+          <p:cNvSpPr>
+            <a:spLocks noGrp="1"/>
+          </p:cNvSpPr>
+          <p:nvPr>
+            <p:ph type="body" sz="quarter" idx="10"/>
+          </p:nvPr>
+        </p:nvSpPr>
+        <p:spPr/>
+        <p:txBody>
+          <a:bodyPr/>
+          <a:lstStyle/>
+          <a:p>
+            <a:r>
+              <a:rPr lang="en-US" dirty="0" err="1"/>
+              <a:t>nsswitch</a:t>
+            </a:r>
+            <a:r>
+              <a:rPr lang="en-US" dirty="0"/>
+              <a:t> </a:t>
+            </a:r>
+            <a:r>
+              <a:rPr lang="en-US" dirty="0" err="1"/>
+              <a:t>getent</a:t>
+            </a:r>
+            <a:endParaRPr lang="en-US" dirty="0"/>
+          </a:p>
+        </p:txBody>
+      </p:sp>
+      <p:pic>
+        <p:nvPicPr>
+          <p:cNvPr id="2" name="Picture 1">
+            <a:extLst>
+              <a:ext uri="{FF2B5EF4-FFF2-40B4-BE49-F238E27FC236}">
+                <a16:creationId xmlns:a16="http://schemas.microsoft.com/office/drawing/2014/main" id="{74C39395-0255-4046-8EA7-9221EA3512D7}"/>
+              </a:ext>
+            </a:extLst>
+          </p:cNvPr>
+          <p:cNvPicPr>
+            <a:picLocks noChangeAspect="1"/>
+          </p:cNvPicPr>
+          <p:nvPr/>
+        </p:nvPicPr>
+        <p:blipFill>
+          <a:blip r:embed="rId2"/>
+          <a:stretch>
+            <a:fillRect/>
+          </a:stretch>
+        </p:blipFill>
+        <p:spPr>
+          <a:xfrm>
+            <a:off x="2912533" y="1469032"/>
+            <a:ext cx="6107289" cy="5187362"/>
+          </a:xfrm>
+          <a:prstGeom prst="rect">
+            <a:avLst/>
+          </a:prstGeom>
+        </p:spPr>
+      </p:pic>
+    </p:spTree>
+    <p:extLst>
+      <p:ext uri="{BB962C8B-B14F-4D97-AF65-F5344CB8AC3E}">
+        <p14:creationId xmlns:p14="http://schemas.microsoft.com/office/powerpoint/2010/main" val="1341646293"/>
+      </p:ext>
+    </p:extLst>
+  </p:cSld>
+  <p:clrMapOvr>
+    <a:masterClrMapping/>
+  </p:clrMapOvr>
+</p:sld>
+</file>
+
+<file path=ppt/slides/slide14.xml><?xml version="1.0" encoding="utf-8"?>
+<p:sld xmlns:a="http://schemas.openxmlformats.org/drawingml/2006/main" xmlns:r="http://schemas.openxmlformats.org/officeDocument/2006/relationships" xmlns:p="http://schemas.openxmlformats.org/presentationml/2006/main">
+  <p:cSld>
+    <p:spTree>
+      <p:nvGrpSpPr>
+        <p:cNvPr id="1" name=""/>
+        <p:cNvGrpSpPr/>
+        <p:nvPr/>
+      </p:nvGrpSpPr>
+      <p:grpSpPr>
+        <a:xfrm>
+          <a:off x="0" y="0"/>
+          <a:ext cx="0" cy="0"/>
+          <a:chOff x="0" y="0"/>
+          <a:chExt cx="0" cy="0"/>
+        </a:xfrm>
+      </p:grpSpPr>
+      <p:sp>
+        <p:nvSpPr>
+          <p:cNvPr id="3" name="Text Placeholder 2">
+            <a:extLst>
+              <a:ext uri="{FF2B5EF4-FFF2-40B4-BE49-F238E27FC236}">
+                <a16:creationId xmlns:a16="http://schemas.microsoft.com/office/drawing/2014/main" id="{99F5DBC8-929E-455F-BA07-52462E7B4FC5}"/>
+              </a:ext>
+            </a:extLst>
+          </p:cNvPr>
+          <p:cNvSpPr>
+            <a:spLocks noGrp="1"/>
+          </p:cNvSpPr>
+          <p:nvPr>
+            <p:ph type="body" sz="quarter" idx="10"/>
+          </p:nvPr>
+        </p:nvSpPr>
+        <p:spPr/>
+        <p:txBody>
+          <a:bodyPr/>
+          <a:lstStyle/>
+          <a:p>
+            <a:r>
+              <a:rPr lang="en-US" dirty="0"/>
+              <a:t>Kernel modules</a:t>
+            </a:r>
+          </a:p>
+        </p:txBody>
+      </p:sp>
+      <p:pic>
+        <p:nvPicPr>
+          <p:cNvPr id="2" name="Picture 1">
+            <a:extLst>
+              <a:ext uri="{FF2B5EF4-FFF2-40B4-BE49-F238E27FC236}">
+                <a16:creationId xmlns:a16="http://schemas.microsoft.com/office/drawing/2014/main" id="{3D1001B3-6C36-5D45-BEDA-E1B8EA47605E}"/>
+              </a:ext>
+            </a:extLst>
+          </p:cNvPr>
+          <p:cNvPicPr>
+            <a:picLocks noChangeAspect="1"/>
+          </p:cNvPicPr>
+          <p:nvPr/>
+        </p:nvPicPr>
+        <p:blipFill>
+          <a:blip r:embed="rId2"/>
+          <a:stretch>
+            <a:fillRect/>
+          </a:stretch>
+        </p:blipFill>
+        <p:spPr>
+          <a:xfrm>
+            <a:off x="2336800" y="1115645"/>
+            <a:ext cx="6705600" cy="4126523"/>
+          </a:xfrm>
+          <a:prstGeom prst="rect">
+            <a:avLst/>
+          </a:prstGeom>
+        </p:spPr>
+      </p:pic>
+    </p:spTree>
+    <p:extLst>
+      <p:ext uri="{BB962C8B-B14F-4D97-AF65-F5344CB8AC3E}">
+        <p14:creationId xmlns:p14="http://schemas.microsoft.com/office/powerpoint/2010/main" val="121817562"/>
+      </p:ext>
+    </p:extLst>
+  </p:cSld>
+  <p:clrMapOvr>
+    <a:masterClrMapping/>
+  </p:clrMapOvr>
+</p:sld>
+</file>
+
+<file path=ppt/slides/slide15.xml><?xml version="1.0" encoding="utf-8"?>
+<p:sld xmlns:a="http://schemas.openxmlformats.org/drawingml/2006/main" xmlns:r="http://schemas.openxmlformats.org/officeDocument/2006/relationships" xmlns:p="http://schemas.openxmlformats.org/presentationml/2006/main">
+  <p:cSld>
+    <p:spTree>
+      <p:nvGrpSpPr>
+        <p:cNvPr id="1" name=""/>
+        <p:cNvGrpSpPr/>
+        <p:nvPr/>
+      </p:nvGrpSpPr>
+      <p:grpSpPr>
+        <a:xfrm>
+          <a:off x="0" y="0"/>
+          <a:ext cx="0" cy="0"/>
+          <a:chOff x="0" y="0"/>
+          <a:chExt cx="0" cy="0"/>
+        </a:xfrm>
+      </p:grpSpPr>
+      <p:sp>
+        <p:nvSpPr>
+          <p:cNvPr id="3" name="Text Placeholder 2">
+            <a:extLst>
+              <a:ext uri="{FF2B5EF4-FFF2-40B4-BE49-F238E27FC236}">
+                <a16:creationId xmlns:a16="http://schemas.microsoft.com/office/drawing/2014/main" id="{99F5DBC8-929E-455F-BA07-52462E7B4FC5}"/>
+              </a:ext>
+            </a:extLst>
+          </p:cNvPr>
+          <p:cNvSpPr>
+            <a:spLocks noGrp="1"/>
+          </p:cNvSpPr>
+          <p:nvPr>
+            <p:ph type="body" sz="quarter" idx="10"/>
+          </p:nvPr>
+        </p:nvSpPr>
+        <p:spPr/>
+        <p:txBody>
+          <a:bodyPr/>
+          <a:lstStyle/>
+          <a:p>
+            <a:r>
+              <a:rPr lang="en-US" dirty="0"/>
+              <a:t>Modules management</a:t>
+            </a:r>
+          </a:p>
+        </p:txBody>
+      </p:sp>
+      <p:pic>
+        <p:nvPicPr>
+          <p:cNvPr id="2" name="Picture 1">
+            <a:extLst>
+              <a:ext uri="{FF2B5EF4-FFF2-40B4-BE49-F238E27FC236}">
+                <a16:creationId xmlns:a16="http://schemas.microsoft.com/office/drawing/2014/main" id="{C15A3DEC-2C90-6A4E-B14E-E0F42EA3BB13}"/>
+              </a:ext>
+            </a:extLst>
+          </p:cNvPr>
+          <p:cNvPicPr>
+            <a:picLocks noChangeAspect="1"/>
+          </p:cNvPicPr>
+          <p:nvPr/>
+        </p:nvPicPr>
+        <p:blipFill>
+          <a:blip r:embed="rId2"/>
+          <a:stretch>
+            <a:fillRect/>
+          </a:stretch>
+        </p:blipFill>
+        <p:spPr>
+          <a:xfrm>
+            <a:off x="7405510" y="1993239"/>
+            <a:ext cx="4033147" cy="3405034"/>
+          </a:xfrm>
+          <a:prstGeom prst="rect">
+            <a:avLst/>
+          </a:prstGeom>
+        </p:spPr>
+      </p:pic>
+      <p:sp>
+        <p:nvSpPr>
+          <p:cNvPr id="4" name="TextBox 3">
+            <a:extLst>
+              <a:ext uri="{FF2B5EF4-FFF2-40B4-BE49-F238E27FC236}">
+                <a16:creationId xmlns:a16="http://schemas.microsoft.com/office/drawing/2014/main" id="{7EEB1C5E-758B-FC48-B533-F848248ABF62}"/>
+              </a:ext>
+            </a:extLst>
+          </p:cNvPr>
+          <p:cNvSpPr txBox="1"/>
+          <p:nvPr/>
+        </p:nvSpPr>
+        <p:spPr>
+          <a:xfrm>
+            <a:off x="857956" y="1704622"/>
+            <a:ext cx="1170000" cy="1754326"/>
+          </a:xfrm>
+          <a:prstGeom prst="rect">
+            <a:avLst/>
+          </a:prstGeom>
+          <a:noFill/>
+        </p:spPr>
+        <p:txBody>
+          <a:bodyPr wrap="none" rtlCol="0">
+            <a:spAutoFit/>
+          </a:bodyPr>
+          <a:lstStyle/>
+          <a:p>
+            <a:r>
+              <a:rPr lang="en-RU" dirty="0"/>
+              <a:t>lsmod</a:t>
+            </a:r>
+          </a:p>
+          <a:p>
+            <a:r>
+              <a:rPr lang="en-RU" dirty="0"/>
+              <a:t>insmod</a:t>
+            </a:r>
+          </a:p>
+          <a:p>
+            <a:r>
+              <a:rPr lang="en-RU" dirty="0"/>
+              <a:t>rmmod</a:t>
+            </a:r>
+          </a:p>
+          <a:p>
+            <a:r>
+              <a:rPr lang="en-RU" dirty="0"/>
+              <a:t>modprobe</a:t>
+            </a:r>
+          </a:p>
+          <a:p>
+            <a:r>
+              <a:rPr lang="en-RU" dirty="0"/>
+              <a:t>depmod</a:t>
+            </a:r>
+          </a:p>
+          <a:p>
+            <a:r>
+              <a:rPr lang="en-RU" dirty="0"/>
+              <a:t>modinfo</a:t>
+            </a:r>
+          </a:p>
+        </p:txBody>
+      </p:sp>
+    </p:spTree>
+    <p:extLst>
+      <p:ext uri="{BB962C8B-B14F-4D97-AF65-F5344CB8AC3E}">
+        <p14:creationId xmlns:p14="http://schemas.microsoft.com/office/powerpoint/2010/main" val="1680124981"/>
+      </p:ext>
+    </p:extLst>
+  </p:cSld>
+  <p:clrMapOvr>
+    <a:masterClrMapping/>
+  </p:clrMapOvr>
+</p:sld>
+</file>
+
+<file path=ppt/slides/slide16.xml><?xml version="1.0" encoding="utf-8"?>
+<p:sld xmlns:a="http://schemas.openxmlformats.org/drawingml/2006/main" xmlns:r="http://schemas.openxmlformats.org/officeDocument/2006/relationships" xmlns:p="http://schemas.openxmlformats.org/presentationml/2006/main">
+  <p:cSld>
+    <p:spTree>
+      <p:nvGrpSpPr>
+        <p:cNvPr id="1" name=""/>
+        <p:cNvGrpSpPr/>
+        <p:nvPr/>
+      </p:nvGrpSpPr>
+      <p:grpSpPr>
+        <a:xfrm>
+          <a:off x="0" y="0"/>
+          <a:ext cx="0" cy="0"/>
+          <a:chOff x="0" y="0"/>
+          <a:chExt cx="0" cy="0"/>
+        </a:xfrm>
+      </p:grpSpPr>
+      <p:sp>
+        <p:nvSpPr>
+          <p:cNvPr id="3" name="Text Placeholder 2">
+            <a:extLst>
+              <a:ext uri="{FF2B5EF4-FFF2-40B4-BE49-F238E27FC236}">
+                <a16:creationId xmlns:a16="http://schemas.microsoft.com/office/drawing/2014/main" id="{99F5DBC8-929E-455F-BA07-52462E7B4FC5}"/>
+              </a:ext>
+            </a:extLst>
+          </p:cNvPr>
+          <p:cNvSpPr>
+            <a:spLocks noGrp="1"/>
+          </p:cNvSpPr>
+          <p:nvPr>
+            <p:ph type="body" sz="quarter" idx="10"/>
+          </p:nvPr>
+        </p:nvSpPr>
+        <p:spPr/>
+        <p:txBody>
+          <a:bodyPr/>
+          <a:lstStyle/>
+          <a:p>
+            <a:r>
+              <a:rPr lang="en-US" dirty="0" err="1"/>
+              <a:t>udevd</a:t>
+            </a:r>
+            <a:endParaRPr lang="en-US" dirty="0"/>
+          </a:p>
+        </p:txBody>
+      </p:sp>
+      <p:pic>
+        <p:nvPicPr>
+          <p:cNvPr id="2" name="Picture 1">
+            <a:extLst>
+              <a:ext uri="{FF2B5EF4-FFF2-40B4-BE49-F238E27FC236}">
+                <a16:creationId xmlns:a16="http://schemas.microsoft.com/office/drawing/2014/main" id="{007CC45C-B6D5-A341-9517-BE1CEF8E2B48}"/>
+              </a:ext>
+            </a:extLst>
+          </p:cNvPr>
+          <p:cNvPicPr>
+            <a:picLocks noChangeAspect="1"/>
+          </p:cNvPicPr>
+          <p:nvPr/>
+        </p:nvPicPr>
+        <p:blipFill>
+          <a:blip r:embed="rId2"/>
+          <a:stretch>
+            <a:fillRect/>
+          </a:stretch>
+        </p:blipFill>
+        <p:spPr>
+          <a:xfrm>
+            <a:off x="2540000" y="1220046"/>
+            <a:ext cx="7112000" cy="5311607"/>
+          </a:xfrm>
+          <a:prstGeom prst="rect">
+            <a:avLst/>
+          </a:prstGeom>
+        </p:spPr>
+      </p:pic>
+    </p:spTree>
+    <p:extLst>
+      <p:ext uri="{BB962C8B-B14F-4D97-AF65-F5344CB8AC3E}">
+        <p14:creationId xmlns:p14="http://schemas.microsoft.com/office/powerpoint/2010/main" val="4019081585"/>
+      </p:ext>
+    </p:extLst>
+  </p:cSld>
+  <p:clrMapOvr>
+    <a:masterClrMapping/>
+  </p:clrMapOvr>
+</p:sld>
+</file>
+
+<file path=ppt/slides/slide17.xml><?xml version="1.0" encoding="utf-8"?>
+<p:sld xmlns:a="http://schemas.openxmlformats.org/drawingml/2006/main" xmlns:r="http://schemas.openxmlformats.org/officeDocument/2006/relationships" xmlns:p="http://schemas.openxmlformats.org/presentationml/2006/main">
+  <p:cSld>
+    <p:spTree>
+      <p:nvGrpSpPr>
+        <p:cNvPr id="1" name=""/>
+        <p:cNvGrpSpPr/>
+        <p:nvPr/>
+      </p:nvGrpSpPr>
+      <p:grpSpPr>
+        <a:xfrm>
+          <a:off x="0" y="0"/>
+          <a:ext cx="0" cy="0"/>
+          <a:chOff x="0" y="0"/>
+          <a:chExt cx="0" cy="0"/>
+        </a:xfrm>
+      </p:grpSpPr>
+      <p:sp>
+        <p:nvSpPr>
+          <p:cNvPr id="3" name="Text Placeholder 2">
+            <a:extLst>
+              <a:ext uri="{FF2B5EF4-FFF2-40B4-BE49-F238E27FC236}">
+                <a16:creationId xmlns:a16="http://schemas.microsoft.com/office/drawing/2014/main" id="{99F5DBC8-929E-455F-BA07-52462E7B4FC5}"/>
+              </a:ext>
+            </a:extLst>
+          </p:cNvPr>
+          <p:cNvSpPr>
+            <a:spLocks noGrp="1"/>
+          </p:cNvSpPr>
+          <p:nvPr>
+            <p:ph type="body" sz="quarter" idx="10"/>
+          </p:nvPr>
+        </p:nvSpPr>
+        <p:spPr/>
+        <p:txBody>
+          <a:bodyPr/>
+          <a:lstStyle/>
+          <a:p>
+            <a:r>
+              <a:rPr lang="en-US" dirty="0"/>
+              <a:t>kernel tuning</a:t>
+            </a:r>
+          </a:p>
+        </p:txBody>
+      </p:sp>
+      <p:sp>
+        <p:nvSpPr>
+          <p:cNvPr id="4" name="TextBox 3">
+            <a:extLst>
+              <a:ext uri="{FF2B5EF4-FFF2-40B4-BE49-F238E27FC236}">
+                <a16:creationId xmlns:a16="http://schemas.microsoft.com/office/drawing/2014/main" id="{B535AA7A-5F5D-284E-B9B2-3073133E0F67}"/>
+              </a:ext>
+            </a:extLst>
+          </p:cNvPr>
+          <p:cNvSpPr txBox="1"/>
+          <p:nvPr/>
+        </p:nvSpPr>
+        <p:spPr>
+          <a:xfrm>
+            <a:off x="2517422" y="1727200"/>
+            <a:ext cx="1666097" cy="1200329"/>
+          </a:xfrm>
+          <a:prstGeom prst="rect">
+            <a:avLst/>
+          </a:prstGeom>
+          <a:noFill/>
+        </p:spPr>
+        <p:txBody>
+          <a:bodyPr wrap="none" rtlCol="0">
+            <a:spAutoFit/>
+          </a:bodyPr>
+          <a:lstStyle/>
+          <a:p>
+            <a:r>
+              <a:rPr lang="en-RU" dirty="0"/>
+              <a:t>sysctl</a:t>
+            </a:r>
+          </a:p>
+          <a:p>
+            <a:r>
+              <a:rPr lang="en-GB" u="sng" dirty="0"/>
+              <a:t>/proc/sys</a:t>
+            </a:r>
+            <a:endParaRPr lang="en-GB" dirty="0"/>
+          </a:p>
+          <a:p>
+            <a:r>
+              <a:rPr lang="en-GB" u="sng" dirty="0"/>
+              <a:t>/etc/</a:t>
+            </a:r>
+            <a:r>
+              <a:rPr lang="en-GB" u="sng" dirty="0" err="1"/>
+              <a:t>sysctl.conf</a:t>
+            </a:r>
+            <a:endParaRPr lang="en-GB" dirty="0"/>
+          </a:p>
+          <a:p>
+            <a:endParaRPr lang="en-RU" dirty="0"/>
+          </a:p>
+        </p:txBody>
+      </p:sp>
+    </p:spTree>
+    <p:extLst>
+      <p:ext uri="{BB962C8B-B14F-4D97-AF65-F5344CB8AC3E}">
+        <p14:creationId xmlns:p14="http://schemas.microsoft.com/office/powerpoint/2010/main" val="1390802565"/>
+      </p:ext>
+    </p:extLst>
+  </p:cSld>
+  <p:clrMapOvr>
+    <a:masterClrMapping/>
+  </p:clrMapOvr>
+</p:sld>
+</file>
+
+<file path=ppt/slides/slide18.xml><?xml version="1.0" encoding="utf-8"?>
+<p:sld xmlns:a="http://schemas.openxmlformats.org/drawingml/2006/main" xmlns:r="http://schemas.openxmlformats.org/officeDocument/2006/relationships" xmlns:p="http://schemas.openxmlformats.org/presentationml/2006/main">
+  <p:cSld>
+    <p:spTree>
+      <p:nvGrpSpPr>
+        <p:cNvPr id="1" name=""/>
+        <p:cNvGrpSpPr/>
+        <p:nvPr/>
+      </p:nvGrpSpPr>
+      <p:grpSpPr>
+        <a:xfrm>
+          <a:off x="0" y="0"/>
+          <a:ext cx="0" cy="0"/>
+          <a:chOff x="0" y="0"/>
+          <a:chExt cx="0" cy="0"/>
+        </a:xfrm>
+      </p:grpSpPr>
+      <p:sp>
+        <p:nvSpPr>
+          <p:cNvPr id="3" name="Text Placeholder 2">
+            <a:extLst>
+              <a:ext uri="{FF2B5EF4-FFF2-40B4-BE49-F238E27FC236}">
+                <a16:creationId xmlns:a16="http://schemas.microsoft.com/office/drawing/2014/main" id="{99F5DBC8-929E-455F-BA07-52462E7B4FC5}"/>
+              </a:ext>
+            </a:extLst>
+          </p:cNvPr>
+          <p:cNvSpPr>
+            <a:spLocks noGrp="1"/>
+          </p:cNvSpPr>
+          <p:nvPr>
+            <p:ph type="body" sz="quarter" idx="10"/>
+          </p:nvPr>
+        </p:nvSpPr>
+        <p:spPr/>
+        <p:txBody>
+          <a:bodyPr/>
+          <a:lstStyle/>
+          <a:p>
+            <a:r>
+              <a:rPr lang="en-US" dirty="0"/>
+              <a:t>kernel build</a:t>
+            </a:r>
+          </a:p>
+        </p:txBody>
+      </p:sp>
+      <p:sp>
+        <p:nvSpPr>
+          <p:cNvPr id="4" name="TextBox 3">
+            <a:extLst>
+              <a:ext uri="{FF2B5EF4-FFF2-40B4-BE49-F238E27FC236}">
+                <a16:creationId xmlns:a16="http://schemas.microsoft.com/office/drawing/2014/main" id="{B535AA7A-5F5D-284E-B9B2-3073133E0F67}"/>
+              </a:ext>
+            </a:extLst>
+          </p:cNvPr>
+          <p:cNvSpPr txBox="1"/>
+          <p:nvPr/>
+        </p:nvSpPr>
+        <p:spPr>
+          <a:xfrm>
+            <a:off x="2517422" y="1727200"/>
+            <a:ext cx="6792757" cy="3693319"/>
+          </a:xfrm>
+          <a:prstGeom prst="rect">
+            <a:avLst/>
+          </a:prstGeom>
+          <a:noFill/>
+        </p:spPr>
+        <p:txBody>
+          <a:bodyPr wrap="none" rtlCol="0">
+            <a:spAutoFit/>
+          </a:bodyPr>
+          <a:lstStyle/>
+          <a:p>
+            <a:pPr marL="285750" indent="-285750">
+              <a:buFont typeface="Arial" panose="020B0604020202020204" pitchFamily="34" charset="0"/>
+              <a:buChar char="•"/>
+            </a:pPr>
+            <a:r>
+              <a:rPr lang="en-GB" dirty="0"/>
+              <a:t>Grab the latest kernel from </a:t>
+            </a:r>
+            <a:r>
+              <a:rPr lang="en-GB" dirty="0" err="1"/>
+              <a:t>kernel.org</a:t>
+            </a:r>
+            <a:endParaRPr lang="en-GB" dirty="0"/>
+          </a:p>
+          <a:p>
+            <a:pPr marL="285750" indent="-285750">
+              <a:buFont typeface="Arial" panose="020B0604020202020204" pitchFamily="34" charset="0"/>
+              <a:buChar char="•"/>
+            </a:pPr>
+            <a:r>
+              <a:rPr lang="en-GB" dirty="0"/>
+              <a:t>Verify kernel</a:t>
+            </a:r>
+          </a:p>
+          <a:p>
+            <a:pPr marL="285750" indent="-285750">
+              <a:buFont typeface="Arial" panose="020B0604020202020204" pitchFamily="34" charset="0"/>
+              <a:buChar char="•"/>
+            </a:pPr>
+            <a:r>
+              <a:rPr lang="en-GB" dirty="0" err="1"/>
+              <a:t>Untar</a:t>
+            </a:r>
+            <a:r>
+              <a:rPr lang="en-GB" dirty="0"/>
+              <a:t> the kernel </a:t>
+            </a:r>
+            <a:r>
+              <a:rPr lang="en-GB" dirty="0" err="1"/>
+              <a:t>tarball</a:t>
+            </a:r>
+            <a:endParaRPr lang="en-GB" dirty="0"/>
+          </a:p>
+          <a:p>
+            <a:pPr marL="285750" indent="-285750">
+              <a:buFont typeface="Arial" panose="020B0604020202020204" pitchFamily="34" charset="0"/>
+              <a:buChar char="•"/>
+            </a:pPr>
+            <a:r>
+              <a:rPr lang="en-GB" dirty="0"/>
+              <a:t>Copy existing Linux kernel config file</a:t>
+            </a:r>
+          </a:p>
+          <a:p>
+            <a:pPr marL="285750" indent="-285750">
+              <a:buFont typeface="Arial" panose="020B0604020202020204" pitchFamily="34" charset="0"/>
+              <a:buChar char="•"/>
+            </a:pPr>
+            <a:r>
+              <a:rPr lang="en-GB" dirty="0"/>
+              <a:t>Compile and build Linux kernel</a:t>
+            </a:r>
+          </a:p>
+          <a:p>
+            <a:pPr marL="285750" indent="-285750">
+              <a:buFont typeface="Arial" panose="020B0604020202020204" pitchFamily="34" charset="0"/>
+              <a:buChar char="•"/>
+            </a:pPr>
+            <a:r>
+              <a:rPr lang="en-GB" dirty="0"/>
+              <a:t>Install Linux kernel and modules (drivers)</a:t>
+            </a:r>
+          </a:p>
+          <a:p>
+            <a:pPr marL="285750" indent="-285750">
+              <a:buFont typeface="Arial" panose="020B0604020202020204" pitchFamily="34" charset="0"/>
+              <a:buChar char="•"/>
+            </a:pPr>
+            <a:r>
+              <a:rPr lang="en-GB" dirty="0"/>
+              <a:t>Update Grub configuration</a:t>
+            </a:r>
+          </a:p>
+          <a:p>
+            <a:pPr marL="285750" indent="-285750">
+              <a:buFont typeface="Arial" panose="020B0604020202020204" pitchFamily="34" charset="0"/>
+              <a:buChar char="•"/>
+            </a:pPr>
+            <a:r>
+              <a:rPr lang="en-GB" dirty="0"/>
+              <a:t>Reboot the system</a:t>
+            </a:r>
+          </a:p>
+          <a:p>
+            <a:pPr marL="285750" indent="-285750">
+              <a:buFont typeface="Arial" panose="020B0604020202020204" pitchFamily="34" charset="0"/>
+              <a:buChar char="•"/>
+            </a:pPr>
+            <a:endParaRPr lang="en-GB" dirty="0"/>
+          </a:p>
+          <a:p>
+            <a:pPr marL="285750" indent="-285750">
+              <a:buFont typeface="Arial" panose="020B0604020202020204" pitchFamily="34" charset="0"/>
+              <a:buChar char="•"/>
+            </a:pPr>
+            <a:endParaRPr lang="en-GB" dirty="0"/>
+          </a:p>
+          <a:p>
+            <a:pPr marL="285750" indent="-285750">
+              <a:buFont typeface="Arial" panose="020B0604020202020204" pitchFamily="34" charset="0"/>
+              <a:buChar char="•"/>
+            </a:pPr>
+            <a:r>
+              <a:rPr lang="en-GB" dirty="0">
+                <a:hlinkClick r:id="rId2"/>
+              </a:rPr>
+              <a:t>https://www.cyberciti.biz/tips/compiling-linux-kernel-26.html</a:t>
+            </a:r>
+            <a:endParaRPr lang="en-GB" dirty="0"/>
+          </a:p>
+          <a:p>
+            <a:pPr marL="285750" indent="-285750">
+              <a:buFont typeface="Arial" panose="020B0604020202020204" pitchFamily="34" charset="0"/>
+              <a:buChar char="•"/>
+            </a:pPr>
+            <a:r>
+              <a:rPr lang="en-GB" dirty="0">
+                <a:hlinkClick r:id="rId3"/>
+              </a:rPr>
+              <a:t>https://www.linux.com/topic/desktop/how-compile-linux-kernel-0/</a:t>
+            </a:r>
+            <a:endParaRPr lang="en-GB" dirty="0"/>
+          </a:p>
+          <a:p>
+            <a:pPr marL="285750" indent="-285750">
+              <a:buFont typeface="Arial" panose="020B0604020202020204" pitchFamily="34" charset="0"/>
+              <a:buChar char="•"/>
+            </a:pPr>
+            <a:endParaRPr lang="en-GB" dirty="0"/>
+          </a:p>
+        </p:txBody>
+      </p:sp>
+    </p:spTree>
+    <p:extLst>
+      <p:ext uri="{BB962C8B-B14F-4D97-AF65-F5344CB8AC3E}">
+        <p14:creationId xmlns:p14="http://schemas.microsoft.com/office/powerpoint/2010/main" val="3208997440"/>
       </p:ext>
     </p:extLst>
   </p:cSld>
@@ -3725,15 +4947,836 @@
           <a:p>
             <a:r>
               <a:rPr lang="en-US" dirty="0"/>
-              <a:t>Users, Groups, passwd, shadow</a:t>
-            </a:r>
-          </a:p>
-        </p:txBody>
-      </p:sp>
+              <a:t>/</a:t>
+            </a:r>
+            <a:r>
+              <a:rPr lang="en-US" dirty="0" err="1"/>
+              <a:t>etc</a:t>
+            </a:r>
+            <a:r>
+              <a:rPr lang="en-US" dirty="0"/>
+              <a:t>/passwd</a:t>
+            </a:r>
+          </a:p>
+        </p:txBody>
+      </p:sp>
+      <p:pic>
+        <p:nvPicPr>
+          <p:cNvPr id="2" name="Picture 1">
+            <a:extLst>
+              <a:ext uri="{FF2B5EF4-FFF2-40B4-BE49-F238E27FC236}">
+                <a16:creationId xmlns:a16="http://schemas.microsoft.com/office/drawing/2014/main" id="{A3536AD2-D89D-114A-9AA6-4E5EE824FBC7}"/>
+              </a:ext>
+            </a:extLst>
+          </p:cNvPr>
+          <p:cNvPicPr>
+            <a:picLocks noChangeAspect="1"/>
+          </p:cNvPicPr>
+          <p:nvPr/>
+        </p:nvPicPr>
+        <p:blipFill>
+          <a:blip r:embed="rId2"/>
+          <a:stretch>
+            <a:fillRect/>
+          </a:stretch>
+        </p:blipFill>
+        <p:spPr>
+          <a:xfrm>
+            <a:off x="1591733" y="2220689"/>
+            <a:ext cx="8381975" cy="2416621"/>
+          </a:xfrm>
+          <a:prstGeom prst="rect">
+            <a:avLst/>
+          </a:prstGeom>
+        </p:spPr>
+      </p:pic>
     </p:spTree>
     <p:extLst>
       <p:ext uri="{BB962C8B-B14F-4D97-AF65-F5344CB8AC3E}">
         <p14:creationId xmlns:p14="http://schemas.microsoft.com/office/powerpoint/2010/main" val="2544742122"/>
+      </p:ext>
+    </p:extLst>
+  </p:cSld>
+  <p:clrMapOvr>
+    <a:masterClrMapping/>
+  </p:clrMapOvr>
+</p:sld>
+</file>
+
+<file path=ppt/slides/slide3.xml><?xml version="1.0" encoding="utf-8"?>
+<p:sld xmlns:a="http://schemas.openxmlformats.org/drawingml/2006/main" xmlns:r="http://schemas.openxmlformats.org/officeDocument/2006/relationships" xmlns:p="http://schemas.openxmlformats.org/presentationml/2006/main">
+  <p:cSld>
+    <p:spTree>
+      <p:nvGrpSpPr>
+        <p:cNvPr id="1" name=""/>
+        <p:cNvGrpSpPr/>
+        <p:nvPr/>
+      </p:nvGrpSpPr>
+      <p:grpSpPr>
+        <a:xfrm>
+          <a:off x="0" y="0"/>
+          <a:ext cx="0" cy="0"/>
+          <a:chOff x="0" y="0"/>
+          <a:chExt cx="0" cy="0"/>
+        </a:xfrm>
+      </p:grpSpPr>
+      <p:sp>
+        <p:nvSpPr>
+          <p:cNvPr id="3" name="Text Placeholder 2">
+            <a:extLst>
+              <a:ext uri="{FF2B5EF4-FFF2-40B4-BE49-F238E27FC236}">
+                <a16:creationId xmlns:a16="http://schemas.microsoft.com/office/drawing/2014/main" id="{99F5DBC8-929E-455F-BA07-52462E7B4FC5}"/>
+              </a:ext>
+            </a:extLst>
+          </p:cNvPr>
+          <p:cNvSpPr>
+            <a:spLocks noGrp="1"/>
+          </p:cNvSpPr>
+          <p:nvPr>
+            <p:ph type="body" sz="quarter" idx="10"/>
+          </p:nvPr>
+        </p:nvSpPr>
+        <p:spPr/>
+        <p:txBody>
+          <a:bodyPr/>
+          <a:lstStyle/>
+          <a:p>
+            <a:r>
+              <a:rPr lang="en-US" dirty="0"/>
+              <a:t>Password</a:t>
+            </a:r>
+          </a:p>
+        </p:txBody>
+      </p:sp>
+      <p:pic>
+        <p:nvPicPr>
+          <p:cNvPr id="4" name="Picture 3">
+            <a:extLst>
+              <a:ext uri="{FF2B5EF4-FFF2-40B4-BE49-F238E27FC236}">
+                <a16:creationId xmlns:a16="http://schemas.microsoft.com/office/drawing/2014/main" id="{1FBECD28-BDF0-4648-98A8-514929E5164D}"/>
+              </a:ext>
+            </a:extLst>
+          </p:cNvPr>
+          <p:cNvPicPr>
+            <a:picLocks noChangeAspect="1"/>
+          </p:cNvPicPr>
+          <p:nvPr/>
+        </p:nvPicPr>
+        <p:blipFill>
+          <a:blip r:embed="rId2"/>
+          <a:stretch>
+            <a:fillRect/>
+          </a:stretch>
+        </p:blipFill>
+        <p:spPr>
+          <a:xfrm>
+            <a:off x="138994" y="1535289"/>
+            <a:ext cx="5735053" cy="3962400"/>
+          </a:xfrm>
+          <a:prstGeom prst="rect">
+            <a:avLst/>
+          </a:prstGeom>
+        </p:spPr>
+      </p:pic>
+      <p:pic>
+        <p:nvPicPr>
+          <p:cNvPr id="5" name="Picture 4">
+            <a:extLst>
+              <a:ext uri="{FF2B5EF4-FFF2-40B4-BE49-F238E27FC236}">
+                <a16:creationId xmlns:a16="http://schemas.microsoft.com/office/drawing/2014/main" id="{1FC0079D-09B8-6D4D-8F07-59176839B249}"/>
+              </a:ext>
+            </a:extLst>
+          </p:cNvPr>
+          <p:cNvPicPr>
+            <a:picLocks noChangeAspect="1"/>
+          </p:cNvPicPr>
+          <p:nvPr/>
+        </p:nvPicPr>
+        <p:blipFill>
+          <a:blip r:embed="rId3"/>
+          <a:stretch>
+            <a:fillRect/>
+          </a:stretch>
+        </p:blipFill>
+        <p:spPr>
+          <a:xfrm>
+            <a:off x="6575820" y="1375987"/>
+            <a:ext cx="5477186" cy="4106026"/>
+          </a:xfrm>
+          <a:prstGeom prst="rect">
+            <a:avLst/>
+          </a:prstGeom>
+        </p:spPr>
+      </p:pic>
+    </p:spTree>
+    <p:extLst>
+      <p:ext uri="{BB962C8B-B14F-4D97-AF65-F5344CB8AC3E}">
+        <p14:creationId xmlns:p14="http://schemas.microsoft.com/office/powerpoint/2010/main" val="3338205205"/>
+      </p:ext>
+    </p:extLst>
+  </p:cSld>
+  <p:clrMapOvr>
+    <a:masterClrMapping/>
+  </p:clrMapOvr>
+</p:sld>
+</file>
+
+<file path=ppt/slides/slide4.xml><?xml version="1.0" encoding="utf-8"?>
+<p:sld xmlns:a="http://schemas.openxmlformats.org/drawingml/2006/main" xmlns:r="http://schemas.openxmlformats.org/officeDocument/2006/relationships" xmlns:p="http://schemas.openxmlformats.org/presentationml/2006/main">
+  <p:cSld>
+    <p:spTree>
+      <p:nvGrpSpPr>
+        <p:cNvPr id="1" name=""/>
+        <p:cNvGrpSpPr/>
+        <p:nvPr/>
+      </p:nvGrpSpPr>
+      <p:grpSpPr>
+        <a:xfrm>
+          <a:off x="0" y="0"/>
+          <a:ext cx="0" cy="0"/>
+          <a:chOff x="0" y="0"/>
+          <a:chExt cx="0" cy="0"/>
+        </a:xfrm>
+      </p:grpSpPr>
+      <p:sp>
+        <p:nvSpPr>
+          <p:cNvPr id="3" name="Text Placeholder 2">
+            <a:extLst>
+              <a:ext uri="{FF2B5EF4-FFF2-40B4-BE49-F238E27FC236}">
+                <a16:creationId xmlns:a16="http://schemas.microsoft.com/office/drawing/2014/main" id="{99F5DBC8-929E-455F-BA07-52462E7B4FC5}"/>
+              </a:ext>
+            </a:extLst>
+          </p:cNvPr>
+          <p:cNvSpPr>
+            <a:spLocks noGrp="1"/>
+          </p:cNvSpPr>
+          <p:nvPr>
+            <p:ph type="body" sz="quarter" idx="10"/>
+          </p:nvPr>
+        </p:nvSpPr>
+        <p:spPr/>
+        <p:txBody>
+          <a:bodyPr/>
+          <a:lstStyle/>
+          <a:p>
+            <a:r>
+              <a:rPr lang="en-US" dirty="0"/>
+              <a:t>/</a:t>
+            </a:r>
+            <a:r>
+              <a:rPr lang="en-US" dirty="0" err="1"/>
+              <a:t>etc</a:t>
+            </a:r>
+            <a:r>
+              <a:rPr lang="en-US" dirty="0"/>
+              <a:t>/shadow</a:t>
+            </a:r>
+          </a:p>
+        </p:txBody>
+      </p:sp>
+      <p:pic>
+        <p:nvPicPr>
+          <p:cNvPr id="4" name="Picture 3">
+            <a:extLst>
+              <a:ext uri="{FF2B5EF4-FFF2-40B4-BE49-F238E27FC236}">
+                <a16:creationId xmlns:a16="http://schemas.microsoft.com/office/drawing/2014/main" id="{53D24E16-0B48-0446-9D8C-AA4166DD48E1}"/>
+              </a:ext>
+            </a:extLst>
+          </p:cNvPr>
+          <p:cNvPicPr>
+            <a:picLocks noChangeAspect="1"/>
+          </p:cNvPicPr>
+          <p:nvPr/>
+        </p:nvPicPr>
+        <p:blipFill>
+          <a:blip r:embed="rId2"/>
+          <a:stretch>
+            <a:fillRect/>
+          </a:stretch>
+        </p:blipFill>
+        <p:spPr>
+          <a:xfrm>
+            <a:off x="1430161" y="2133599"/>
+            <a:ext cx="8457469" cy="2348089"/>
+          </a:xfrm>
+          <a:prstGeom prst="rect">
+            <a:avLst/>
+          </a:prstGeom>
+        </p:spPr>
+      </p:pic>
+    </p:spTree>
+    <p:extLst>
+      <p:ext uri="{BB962C8B-B14F-4D97-AF65-F5344CB8AC3E}">
+        <p14:creationId xmlns:p14="http://schemas.microsoft.com/office/powerpoint/2010/main" val="2634228372"/>
+      </p:ext>
+    </p:extLst>
+  </p:cSld>
+  <p:clrMapOvr>
+    <a:masterClrMapping/>
+  </p:clrMapOvr>
+</p:sld>
+</file>
+
+<file path=ppt/slides/slide5.xml><?xml version="1.0" encoding="utf-8"?>
+<p:sld xmlns:a="http://schemas.openxmlformats.org/drawingml/2006/main" xmlns:r="http://schemas.openxmlformats.org/officeDocument/2006/relationships" xmlns:p="http://schemas.openxmlformats.org/presentationml/2006/main">
+  <p:cSld>
+    <p:spTree>
+      <p:nvGrpSpPr>
+        <p:cNvPr id="1" name=""/>
+        <p:cNvGrpSpPr/>
+        <p:nvPr/>
+      </p:nvGrpSpPr>
+      <p:grpSpPr>
+        <a:xfrm>
+          <a:off x="0" y="0"/>
+          <a:ext cx="0" cy="0"/>
+          <a:chOff x="0" y="0"/>
+          <a:chExt cx="0" cy="0"/>
+        </a:xfrm>
+      </p:grpSpPr>
+      <p:sp>
+        <p:nvSpPr>
+          <p:cNvPr id="3" name="Text Placeholder 2">
+            <a:extLst>
+              <a:ext uri="{FF2B5EF4-FFF2-40B4-BE49-F238E27FC236}">
+                <a16:creationId xmlns:a16="http://schemas.microsoft.com/office/drawing/2014/main" id="{99F5DBC8-929E-455F-BA07-52462E7B4FC5}"/>
+              </a:ext>
+            </a:extLst>
+          </p:cNvPr>
+          <p:cNvSpPr>
+            <a:spLocks noGrp="1"/>
+          </p:cNvSpPr>
+          <p:nvPr>
+            <p:ph type="body" sz="quarter" idx="10"/>
+          </p:nvPr>
+        </p:nvSpPr>
+        <p:spPr/>
+        <p:txBody>
+          <a:bodyPr/>
+          <a:lstStyle/>
+          <a:p>
+            <a:r>
+              <a:rPr lang="en-US" dirty="0"/>
+              <a:t>/</a:t>
+            </a:r>
+            <a:r>
+              <a:rPr lang="en-US" dirty="0" err="1"/>
+              <a:t>etc</a:t>
+            </a:r>
+            <a:r>
+              <a:rPr lang="en-US" dirty="0"/>
+              <a:t>/group</a:t>
+            </a:r>
+          </a:p>
+        </p:txBody>
+      </p:sp>
+      <p:pic>
+        <p:nvPicPr>
+          <p:cNvPr id="4" name="Picture 3">
+            <a:extLst>
+              <a:ext uri="{FF2B5EF4-FFF2-40B4-BE49-F238E27FC236}">
+                <a16:creationId xmlns:a16="http://schemas.microsoft.com/office/drawing/2014/main" id="{B7E1C717-4122-4F4B-BD52-BCA38819BFB2}"/>
+              </a:ext>
+            </a:extLst>
+          </p:cNvPr>
+          <p:cNvPicPr>
+            <a:picLocks noChangeAspect="1"/>
+          </p:cNvPicPr>
+          <p:nvPr/>
+        </p:nvPicPr>
+        <p:blipFill>
+          <a:blip r:embed="rId2"/>
+          <a:stretch>
+            <a:fillRect/>
+          </a:stretch>
+        </p:blipFill>
+        <p:spPr>
+          <a:xfrm>
+            <a:off x="3018740" y="1122102"/>
+            <a:ext cx="6154519" cy="4613796"/>
+          </a:xfrm>
+          <a:prstGeom prst="rect">
+            <a:avLst/>
+          </a:prstGeom>
+        </p:spPr>
+      </p:pic>
+    </p:spTree>
+    <p:extLst>
+      <p:ext uri="{BB962C8B-B14F-4D97-AF65-F5344CB8AC3E}">
+        <p14:creationId xmlns:p14="http://schemas.microsoft.com/office/powerpoint/2010/main" val="476387494"/>
+      </p:ext>
+    </p:extLst>
+  </p:cSld>
+  <p:clrMapOvr>
+    <a:masterClrMapping/>
+  </p:clrMapOvr>
+</p:sld>
+</file>
+
+<file path=ppt/slides/slide6.xml><?xml version="1.0" encoding="utf-8"?>
+<p:sld xmlns:a="http://schemas.openxmlformats.org/drawingml/2006/main" xmlns:r="http://schemas.openxmlformats.org/officeDocument/2006/relationships" xmlns:p="http://schemas.openxmlformats.org/presentationml/2006/main">
+  <p:cSld>
+    <p:spTree>
+      <p:nvGrpSpPr>
+        <p:cNvPr id="1" name=""/>
+        <p:cNvGrpSpPr/>
+        <p:nvPr/>
+      </p:nvGrpSpPr>
+      <p:grpSpPr>
+        <a:xfrm>
+          <a:off x="0" y="0"/>
+          <a:ext cx="0" cy="0"/>
+          <a:chOff x="0" y="0"/>
+          <a:chExt cx="0" cy="0"/>
+        </a:xfrm>
+      </p:grpSpPr>
+      <p:sp>
+        <p:nvSpPr>
+          <p:cNvPr id="3" name="Text Placeholder 2">
+            <a:extLst>
+              <a:ext uri="{FF2B5EF4-FFF2-40B4-BE49-F238E27FC236}">
+                <a16:creationId xmlns:a16="http://schemas.microsoft.com/office/drawing/2014/main" id="{99F5DBC8-929E-455F-BA07-52462E7B4FC5}"/>
+              </a:ext>
+            </a:extLst>
+          </p:cNvPr>
+          <p:cNvSpPr>
+            <a:spLocks noGrp="1"/>
+          </p:cNvSpPr>
+          <p:nvPr>
+            <p:ph type="body" sz="quarter" idx="10"/>
+          </p:nvPr>
+        </p:nvSpPr>
+        <p:spPr/>
+        <p:txBody>
+          <a:bodyPr/>
+          <a:lstStyle/>
+          <a:p>
+            <a:r>
+              <a:rPr lang="en-US" dirty="0"/>
+              <a:t>/</a:t>
+            </a:r>
+            <a:r>
+              <a:rPr lang="en-US" dirty="0" err="1"/>
+              <a:t>etc</a:t>
+            </a:r>
+            <a:r>
+              <a:rPr lang="en-US" dirty="0"/>
+              <a:t>/</a:t>
+            </a:r>
+            <a:r>
+              <a:rPr lang="en-US" dirty="0" err="1"/>
+              <a:t>gshadow</a:t>
+            </a:r>
+            <a:r>
+              <a:rPr lang="en-US" dirty="0"/>
+              <a:t> ????</a:t>
+            </a:r>
+          </a:p>
+        </p:txBody>
+      </p:sp>
+      <p:pic>
+        <p:nvPicPr>
+          <p:cNvPr id="2" name="Picture 1">
+            <a:extLst>
+              <a:ext uri="{FF2B5EF4-FFF2-40B4-BE49-F238E27FC236}">
+                <a16:creationId xmlns:a16="http://schemas.microsoft.com/office/drawing/2014/main" id="{7178F8E9-F5F9-DC49-B0BF-9DC509921188}"/>
+              </a:ext>
+            </a:extLst>
+          </p:cNvPr>
+          <p:cNvPicPr>
+            <a:picLocks noChangeAspect="1"/>
+          </p:cNvPicPr>
+          <p:nvPr/>
+        </p:nvPicPr>
+        <p:blipFill>
+          <a:blip r:embed="rId2"/>
+          <a:stretch>
+            <a:fillRect/>
+          </a:stretch>
+        </p:blipFill>
+        <p:spPr>
+          <a:xfrm>
+            <a:off x="3770489" y="1653155"/>
+            <a:ext cx="4651022" cy="3551690"/>
+          </a:xfrm>
+          <a:prstGeom prst="rect">
+            <a:avLst/>
+          </a:prstGeom>
+        </p:spPr>
+      </p:pic>
+    </p:spTree>
+    <p:extLst>
+      <p:ext uri="{BB962C8B-B14F-4D97-AF65-F5344CB8AC3E}">
+        <p14:creationId xmlns:p14="http://schemas.microsoft.com/office/powerpoint/2010/main" val="4050199831"/>
+      </p:ext>
+    </p:extLst>
+  </p:cSld>
+  <p:clrMapOvr>
+    <a:masterClrMapping/>
+  </p:clrMapOvr>
+</p:sld>
+</file>
+
+<file path=ppt/slides/slide7.xml><?xml version="1.0" encoding="utf-8"?>
+<p:sld xmlns:a="http://schemas.openxmlformats.org/drawingml/2006/main" xmlns:r="http://schemas.openxmlformats.org/officeDocument/2006/relationships" xmlns:p="http://schemas.openxmlformats.org/presentationml/2006/main">
+  <p:cSld>
+    <p:spTree>
+      <p:nvGrpSpPr>
+        <p:cNvPr id="1" name=""/>
+        <p:cNvGrpSpPr/>
+        <p:nvPr/>
+      </p:nvGrpSpPr>
+      <p:grpSpPr>
+        <a:xfrm>
+          <a:off x="0" y="0"/>
+          <a:ext cx="0" cy="0"/>
+          <a:chOff x="0" y="0"/>
+          <a:chExt cx="0" cy="0"/>
+        </a:xfrm>
+      </p:grpSpPr>
+      <p:sp>
+        <p:nvSpPr>
+          <p:cNvPr id="3" name="Text Placeholder 2">
+            <a:extLst>
+              <a:ext uri="{FF2B5EF4-FFF2-40B4-BE49-F238E27FC236}">
+                <a16:creationId xmlns:a16="http://schemas.microsoft.com/office/drawing/2014/main" id="{99F5DBC8-929E-455F-BA07-52462E7B4FC5}"/>
+              </a:ext>
+            </a:extLst>
+          </p:cNvPr>
+          <p:cNvSpPr>
+            <a:spLocks noGrp="1"/>
+          </p:cNvSpPr>
+          <p:nvPr>
+            <p:ph type="body" sz="quarter" idx="10"/>
+          </p:nvPr>
+        </p:nvSpPr>
+        <p:spPr/>
+        <p:txBody>
+          <a:bodyPr/>
+          <a:lstStyle/>
+          <a:p>
+            <a:r>
+              <a:rPr lang="en-US" dirty="0"/>
+              <a:t>Users management</a:t>
+            </a:r>
+          </a:p>
+        </p:txBody>
+      </p:sp>
+      <p:sp>
+        <p:nvSpPr>
+          <p:cNvPr id="2" name="TextBox 1">
+            <a:extLst>
+              <a:ext uri="{FF2B5EF4-FFF2-40B4-BE49-F238E27FC236}">
+                <a16:creationId xmlns:a16="http://schemas.microsoft.com/office/drawing/2014/main" id="{F6335E74-9AFE-4543-9F1F-F3042CF2F16D}"/>
+              </a:ext>
+            </a:extLst>
+          </p:cNvPr>
+          <p:cNvSpPr txBox="1"/>
+          <p:nvPr/>
+        </p:nvSpPr>
+        <p:spPr>
+          <a:xfrm>
+            <a:off x="3048000" y="2449689"/>
+            <a:ext cx="1163588" cy="2031325"/>
+          </a:xfrm>
+          <a:prstGeom prst="rect">
+            <a:avLst/>
+          </a:prstGeom>
+          <a:noFill/>
+        </p:spPr>
+        <p:txBody>
+          <a:bodyPr wrap="none" rtlCol="0">
+            <a:spAutoFit/>
+          </a:bodyPr>
+          <a:lstStyle/>
+          <a:p>
+            <a:r>
+              <a:rPr lang="en-US" dirty="0" err="1"/>
+              <a:t>useradd</a:t>
+            </a:r>
+            <a:endParaRPr lang="en-US" dirty="0"/>
+          </a:p>
+          <a:p>
+            <a:r>
+              <a:rPr lang="en-US" dirty="0" err="1"/>
+              <a:t>usermod</a:t>
+            </a:r>
+            <a:endParaRPr lang="en-US" dirty="0"/>
+          </a:p>
+          <a:p>
+            <a:r>
+              <a:rPr lang="en-US" dirty="0" err="1"/>
+              <a:t>userdel</a:t>
+            </a:r>
+            <a:endParaRPr lang="en-US" dirty="0"/>
+          </a:p>
+          <a:p>
+            <a:endParaRPr lang="en-US" dirty="0"/>
+          </a:p>
+          <a:p>
+            <a:r>
+              <a:rPr lang="en-US" dirty="0" err="1"/>
+              <a:t>groupadd</a:t>
+            </a:r>
+            <a:endParaRPr lang="en-US" dirty="0"/>
+          </a:p>
+          <a:p>
+            <a:r>
+              <a:rPr lang="en-US" dirty="0" err="1"/>
+              <a:t>groupmod</a:t>
+            </a:r>
+            <a:endParaRPr lang="en-US" dirty="0"/>
+          </a:p>
+          <a:p>
+            <a:r>
+              <a:rPr lang="en-US" dirty="0" err="1"/>
+              <a:t>groupdel</a:t>
+            </a:r>
+            <a:endParaRPr lang="en-RU" dirty="0"/>
+          </a:p>
+        </p:txBody>
+      </p:sp>
+    </p:spTree>
+    <p:extLst>
+      <p:ext uri="{BB962C8B-B14F-4D97-AF65-F5344CB8AC3E}">
+        <p14:creationId xmlns:p14="http://schemas.microsoft.com/office/powerpoint/2010/main" val="1296107675"/>
+      </p:ext>
+    </p:extLst>
+  </p:cSld>
+  <p:clrMapOvr>
+    <a:masterClrMapping/>
+  </p:clrMapOvr>
+</p:sld>
+</file>
+
+<file path=ppt/slides/slide8.xml><?xml version="1.0" encoding="utf-8"?>
+<p:sld xmlns:a="http://schemas.openxmlformats.org/drawingml/2006/main" xmlns:r="http://schemas.openxmlformats.org/officeDocument/2006/relationships" xmlns:p="http://schemas.openxmlformats.org/presentationml/2006/main">
+  <p:cSld>
+    <p:spTree>
+      <p:nvGrpSpPr>
+        <p:cNvPr id="1" name=""/>
+        <p:cNvGrpSpPr/>
+        <p:nvPr/>
+      </p:nvGrpSpPr>
+      <p:grpSpPr>
+        <a:xfrm>
+          <a:off x="0" y="0"/>
+          <a:ext cx="0" cy="0"/>
+          <a:chOff x="0" y="0"/>
+          <a:chExt cx="0" cy="0"/>
+        </a:xfrm>
+      </p:grpSpPr>
+      <p:sp>
+        <p:nvSpPr>
+          <p:cNvPr id="3" name="Text Placeholder 2">
+            <a:extLst>
+              <a:ext uri="{FF2B5EF4-FFF2-40B4-BE49-F238E27FC236}">
+                <a16:creationId xmlns:a16="http://schemas.microsoft.com/office/drawing/2014/main" id="{99F5DBC8-929E-455F-BA07-52462E7B4FC5}"/>
+              </a:ext>
+            </a:extLst>
+          </p:cNvPr>
+          <p:cNvSpPr>
+            <a:spLocks noGrp="1"/>
+          </p:cNvSpPr>
+          <p:nvPr>
+            <p:ph type="body" sz="quarter" idx="10"/>
+          </p:nvPr>
+        </p:nvSpPr>
+        <p:spPr/>
+        <p:txBody>
+          <a:bodyPr/>
+          <a:lstStyle/>
+          <a:p>
+            <a:r>
+              <a:rPr lang="en-US" dirty="0"/>
+              <a:t>Users management</a:t>
+            </a:r>
+          </a:p>
+        </p:txBody>
+      </p:sp>
+      <p:sp>
+        <p:nvSpPr>
+          <p:cNvPr id="2" name="TextBox 1">
+            <a:extLst>
+              <a:ext uri="{FF2B5EF4-FFF2-40B4-BE49-F238E27FC236}">
+                <a16:creationId xmlns:a16="http://schemas.microsoft.com/office/drawing/2014/main" id="{F6335E74-9AFE-4543-9F1F-F3042CF2F16D}"/>
+              </a:ext>
+            </a:extLst>
+          </p:cNvPr>
+          <p:cNvSpPr txBox="1"/>
+          <p:nvPr/>
+        </p:nvSpPr>
+        <p:spPr>
+          <a:xfrm>
+            <a:off x="3048000" y="2449689"/>
+            <a:ext cx="1846596" cy="2585323"/>
+          </a:xfrm>
+          <a:prstGeom prst="rect">
+            <a:avLst/>
+          </a:prstGeom>
+          <a:noFill/>
+        </p:spPr>
+        <p:txBody>
+          <a:bodyPr wrap="none" rtlCol="0">
+            <a:spAutoFit/>
+          </a:bodyPr>
+          <a:lstStyle/>
+          <a:p>
+            <a:r>
+              <a:rPr lang="en-US" dirty="0" err="1"/>
+              <a:t>adduser</a:t>
+            </a:r>
+            <a:endParaRPr lang="en-US" dirty="0"/>
+          </a:p>
+          <a:p>
+            <a:r>
+              <a:rPr lang="en-RU" dirty="0"/>
+              <a:t>deluser</a:t>
+            </a:r>
+          </a:p>
+          <a:p>
+            <a:endParaRPr lang="en-RU" dirty="0"/>
+          </a:p>
+          <a:p>
+            <a:r>
+              <a:rPr lang="en-RU" dirty="0"/>
+              <a:t>addgroup</a:t>
+            </a:r>
+          </a:p>
+          <a:p>
+            <a:r>
+              <a:rPr lang="en-RU" dirty="0"/>
+              <a:t>delgroup</a:t>
+            </a:r>
+          </a:p>
+          <a:p>
+            <a:endParaRPr lang="en-RU" dirty="0"/>
+          </a:p>
+          <a:p>
+            <a:r>
+              <a:rPr lang="en-RU" dirty="0"/>
+              <a:t>/etc/adduser.conf</a:t>
+            </a:r>
+          </a:p>
+          <a:p>
+            <a:r>
+              <a:rPr lang="en-RU" dirty="0"/>
+              <a:t>/etc/deluser.conf</a:t>
+            </a:r>
+          </a:p>
+          <a:p>
+            <a:r>
+              <a:rPr lang="en-RU" dirty="0"/>
+              <a:t>…</a:t>
+            </a:r>
+            <a:endParaRPr lang="en-US" dirty="0"/>
+          </a:p>
+        </p:txBody>
+      </p:sp>
+    </p:spTree>
+    <p:extLst>
+      <p:ext uri="{BB962C8B-B14F-4D97-AF65-F5344CB8AC3E}">
+        <p14:creationId xmlns:p14="http://schemas.microsoft.com/office/powerpoint/2010/main" val="2842151497"/>
+      </p:ext>
+    </p:extLst>
+  </p:cSld>
+  <p:clrMapOvr>
+    <a:masterClrMapping/>
+  </p:clrMapOvr>
+</p:sld>
+</file>
+
+<file path=ppt/slides/slide9.xml><?xml version="1.0" encoding="utf-8"?>
+<p:sld xmlns:a="http://schemas.openxmlformats.org/drawingml/2006/main" xmlns:r="http://schemas.openxmlformats.org/officeDocument/2006/relationships" xmlns:p="http://schemas.openxmlformats.org/presentationml/2006/main">
+  <p:cSld>
+    <p:spTree>
+      <p:nvGrpSpPr>
+        <p:cNvPr id="1" name=""/>
+        <p:cNvGrpSpPr/>
+        <p:nvPr/>
+      </p:nvGrpSpPr>
+      <p:grpSpPr>
+        <a:xfrm>
+          <a:off x="0" y="0"/>
+          <a:ext cx="0" cy="0"/>
+          <a:chOff x="0" y="0"/>
+          <a:chExt cx="0" cy="0"/>
+        </a:xfrm>
+      </p:grpSpPr>
+      <p:sp>
+        <p:nvSpPr>
+          <p:cNvPr id="3" name="Text Placeholder 2">
+            <a:extLst>
+              <a:ext uri="{FF2B5EF4-FFF2-40B4-BE49-F238E27FC236}">
+                <a16:creationId xmlns:a16="http://schemas.microsoft.com/office/drawing/2014/main" id="{99F5DBC8-929E-455F-BA07-52462E7B4FC5}"/>
+              </a:ext>
+            </a:extLst>
+          </p:cNvPr>
+          <p:cNvSpPr>
+            <a:spLocks noGrp="1"/>
+          </p:cNvSpPr>
+          <p:nvPr>
+            <p:ph type="body" sz="quarter" idx="10"/>
+          </p:nvPr>
+        </p:nvSpPr>
+        <p:spPr/>
+        <p:txBody>
+          <a:bodyPr/>
+          <a:lstStyle/>
+          <a:p>
+            <a:r>
+              <a:rPr lang="en-US" dirty="0"/>
+              <a:t>Users management</a:t>
+            </a:r>
+          </a:p>
+        </p:txBody>
+      </p:sp>
+      <p:sp>
+        <p:nvSpPr>
+          <p:cNvPr id="2" name="TextBox 1">
+            <a:extLst>
+              <a:ext uri="{FF2B5EF4-FFF2-40B4-BE49-F238E27FC236}">
+                <a16:creationId xmlns:a16="http://schemas.microsoft.com/office/drawing/2014/main" id="{F6335E74-9AFE-4543-9F1F-F3042CF2F16D}"/>
+              </a:ext>
+            </a:extLst>
+          </p:cNvPr>
+          <p:cNvSpPr txBox="1"/>
+          <p:nvPr/>
+        </p:nvSpPr>
+        <p:spPr>
+          <a:xfrm>
+            <a:off x="3048000" y="2449689"/>
+            <a:ext cx="1134734" cy="646331"/>
+          </a:xfrm>
+          <a:prstGeom prst="rect">
+            <a:avLst/>
+          </a:prstGeom>
+          <a:noFill/>
+        </p:spPr>
+        <p:txBody>
+          <a:bodyPr wrap="none" rtlCol="0">
+            <a:spAutoFit/>
+          </a:bodyPr>
+          <a:lstStyle/>
+          <a:p>
+            <a:r>
+              <a:rPr lang="en-US" dirty="0" err="1"/>
+              <a:t>newusers</a:t>
+            </a:r>
+            <a:endParaRPr lang="en-US" dirty="0"/>
+          </a:p>
+          <a:p>
+            <a:r>
+              <a:rPr lang="en-US" dirty="0"/>
+              <a:t>newgroup</a:t>
+            </a:r>
+          </a:p>
+        </p:txBody>
+      </p:sp>
+    </p:spTree>
+    <p:extLst>
+      <p:ext uri="{BB962C8B-B14F-4D97-AF65-F5344CB8AC3E}">
+        <p14:creationId xmlns:p14="http://schemas.microsoft.com/office/powerpoint/2010/main" val="2547444456"/>
       </p:ext>
     </p:extLst>
   </p:cSld>

</xml_diff>